<commit_message>
added a slide about SSN redaction
</commit_message>
<xml_diff>
--- a/PowerPoints/Phase 2 - Overview/008 Protected Health Information and APCD Security.pptx
+++ b/PowerPoints/Phase 2 - Overview/008 Protected Health Information and APCD Security.pptx
@@ -11,7 +11,8 @@
     <p:sldId id="258" r:id="rId5"/>
     <p:sldId id="259" r:id="rId6"/>
     <p:sldId id="260" r:id="rId7"/>
-    <p:sldId id="261" r:id="rId8"/>
+    <p:sldId id="262" r:id="rId8"/>
+    <p:sldId id="261" r:id="rId9"/>
   </p:sldIdLst>
   <p:sldSz cx="12192000" cy="6858000"/>
   <p:notesSz cx="6858000" cy="9144000"/>
@@ -255,7 +256,7 @@
           <a:p>
             <a:fld id="{FF632088-7E42-4B13-8645-6CA4616862AF}" type="datetimeFigureOut">
               <a:rPr lang="en-US" smtClean="0"/>
-              <a:t>2/23/2016</a:t>
+              <a:t>2/29/2016</a:t>
             </a:fld>
             <a:endParaRPr lang="en-US"/>
           </a:p>
@@ -425,7 +426,7 @@
           <a:p>
             <a:fld id="{FF632088-7E42-4B13-8645-6CA4616862AF}" type="datetimeFigureOut">
               <a:rPr lang="en-US" smtClean="0"/>
-              <a:t>2/23/2016</a:t>
+              <a:t>2/29/2016</a:t>
             </a:fld>
             <a:endParaRPr lang="en-US"/>
           </a:p>
@@ -605,7 +606,7 @@
           <a:p>
             <a:fld id="{FF632088-7E42-4B13-8645-6CA4616862AF}" type="datetimeFigureOut">
               <a:rPr lang="en-US" smtClean="0"/>
-              <a:t>2/23/2016</a:t>
+              <a:t>2/29/2016</a:t>
             </a:fld>
             <a:endParaRPr lang="en-US"/>
           </a:p>
@@ -805,7 +806,7 @@
           <a:p>
             <a:fld id="{FF632088-7E42-4B13-8645-6CA4616862AF}" type="datetimeFigureOut">
               <a:rPr lang="en-US" smtClean="0"/>
-              <a:t>2/23/2016</a:t>
+              <a:t>2/29/2016</a:t>
             </a:fld>
             <a:endParaRPr lang="en-US"/>
           </a:p>
@@ -1022,7 +1023,7 @@
           <a:p>
             <a:fld id="{FF632088-7E42-4B13-8645-6CA4616862AF}" type="datetimeFigureOut">
               <a:rPr lang="en-US" smtClean="0"/>
-              <a:t>2/23/2016</a:t>
+              <a:t>2/29/2016</a:t>
             </a:fld>
             <a:endParaRPr lang="en-US"/>
           </a:p>
@@ -1307,7 +1308,7 @@
           <a:p>
             <a:fld id="{FF632088-7E42-4B13-8645-6CA4616862AF}" type="datetimeFigureOut">
               <a:rPr lang="en-US" smtClean="0"/>
-              <a:t>2/23/2016</a:t>
+              <a:t>2/29/2016</a:t>
             </a:fld>
             <a:endParaRPr lang="en-US"/>
           </a:p>
@@ -1581,7 +1582,7 @@
           <a:p>
             <a:fld id="{FF632088-7E42-4B13-8645-6CA4616862AF}" type="datetimeFigureOut">
               <a:rPr lang="en-US" smtClean="0"/>
-              <a:t>2/23/2016</a:t>
+              <a:t>2/29/2016</a:t>
             </a:fld>
             <a:endParaRPr lang="en-US"/>
           </a:p>
@@ -1678,7 +1679,7 @@
   </p:clrMapOvr>
   <p:extLst>
     <p:ext uri="{DCECCB84-F9BA-43D5-87BE-67443E8EF086}">
-      <p15:sldGuideLst xmlns="" xmlns:p15="http://schemas.microsoft.com/office/powerpoint/2012/main"/>
+      <p15:sldGuideLst xmlns:p15="http://schemas.microsoft.com/office/powerpoint/2012/main" xmlns=""/>
     </p:ext>
   </p:extLst>
 </p:sldLayout>
@@ -2008,7 +2009,7 @@
           <a:p>
             <a:fld id="{FF632088-7E42-4B13-8645-6CA4616862AF}" type="datetimeFigureOut">
               <a:rPr lang="en-US" smtClean="0"/>
-              <a:t>2/23/2016</a:t>
+              <a:t>2/29/2016</a:t>
             </a:fld>
             <a:endParaRPr lang="en-US"/>
           </a:p>
@@ -2105,7 +2106,7 @@
   </p:clrMapOvr>
   <p:extLst>
     <p:ext uri="{DCECCB84-F9BA-43D5-87BE-67443E8EF086}">
-      <p15:sldGuideLst xmlns="" xmlns:p15="http://schemas.microsoft.com/office/powerpoint/2012/main"/>
+      <p15:sldGuideLst xmlns:p15="http://schemas.microsoft.com/office/powerpoint/2012/main" xmlns=""/>
     </p:ext>
   </p:extLst>
 </p:sldLayout>
@@ -2168,7 +2169,7 @@
           <a:p>
             <a:fld id="{FF632088-7E42-4B13-8645-6CA4616862AF}" type="datetimeFigureOut">
               <a:rPr lang="en-US" smtClean="0"/>
-              <a:t>2/23/2016</a:t>
+              <a:t>2/29/2016</a:t>
             </a:fld>
             <a:endParaRPr lang="en-US"/>
           </a:p>
@@ -2300,7 +2301,7 @@
           <a:p>
             <a:fld id="{FF632088-7E42-4B13-8645-6CA4616862AF}" type="datetimeFigureOut">
               <a:rPr lang="en-US" smtClean="0"/>
-              <a:t>2/23/2016</a:t>
+              <a:t>2/29/2016</a:t>
             </a:fld>
             <a:endParaRPr lang="en-US"/>
           </a:p>
@@ -2551,7 +2552,7 @@
           <a:p>
             <a:fld id="{FF632088-7E42-4B13-8645-6CA4616862AF}" type="datetimeFigureOut">
               <a:rPr lang="en-US" smtClean="0"/>
-              <a:t>2/23/2016</a:t>
+              <a:t>2/29/2016</a:t>
             </a:fld>
             <a:endParaRPr lang="en-US"/>
           </a:p>
@@ -2648,7 +2649,7 @@
   </p:clrMapOvr>
   <p:extLst>
     <p:ext uri="{DCECCB84-F9BA-43D5-87BE-67443E8EF086}">
-      <p15:sldGuideLst xmlns="" xmlns:p15="http://schemas.microsoft.com/office/powerpoint/2012/main"/>
+      <p15:sldGuideLst xmlns:p15="http://schemas.microsoft.com/office/powerpoint/2012/main" xmlns=""/>
     </p:ext>
   </p:extLst>
 </p:sldLayout>
@@ -2763,7 +2764,7 @@
           <a:p>
             <a:fld id="{FF632088-7E42-4B13-8645-6CA4616862AF}" type="datetimeFigureOut">
               <a:rPr lang="en-US" smtClean="0"/>
-              <a:t>2/23/2016</a:t>
+              <a:t>2/29/2016</a:t>
             </a:fld>
             <a:endParaRPr lang="en-US"/>
           </a:p>
@@ -3181,7 +3182,7 @@
           <a:p>
             <a:fld id="{FF632088-7E42-4B13-8645-6CA4616862AF}" type="datetimeFigureOut">
               <a:rPr lang="en-US" smtClean="0"/>
-              <a:t>2/23/2016</a:t>
+              <a:t>2/29/2016</a:t>
             </a:fld>
             <a:endParaRPr lang="en-US"/>
           </a:p>
@@ -3393,7 +3394,7 @@
           <a:p>
             <a:fld id="{FF632088-7E42-4B13-8645-6CA4616862AF}" type="datetimeFigureOut">
               <a:rPr lang="en-US" smtClean="0"/>
-              <a:t>2/23/2016</a:t>
+              <a:t>2/29/2016</a:t>
             </a:fld>
             <a:endParaRPr lang="en-US"/>
           </a:p>
@@ -3614,7 +3615,7 @@
           <a:p>
             <a:fld id="{FF632088-7E42-4B13-8645-6CA4616862AF}" type="datetimeFigureOut">
               <a:rPr lang="en-US" smtClean="0"/>
-              <a:t>2/23/2016</a:t>
+              <a:t>2/29/2016</a:t>
             </a:fld>
             <a:endParaRPr lang="en-US"/>
           </a:p>
@@ -3902,7 +3903,7 @@
           <a:p>
             <a:fld id="{FF632088-7E42-4B13-8645-6CA4616862AF}" type="datetimeFigureOut">
               <a:rPr lang="en-US" smtClean="0"/>
-              <a:t>2/23/2016</a:t>
+              <a:t>2/29/2016</a:t>
             </a:fld>
             <a:endParaRPr lang="en-US"/>
           </a:p>
@@ -4134,7 +4135,7 @@
           <a:p>
             <a:fld id="{FF632088-7E42-4B13-8645-6CA4616862AF}" type="datetimeFigureOut">
               <a:rPr lang="en-US" smtClean="0"/>
-              <a:t>2/23/2016</a:t>
+              <a:t>2/29/2016</a:t>
             </a:fld>
             <a:endParaRPr lang="en-US"/>
           </a:p>
@@ -4194,7 +4195,7 @@
   </p:clrMapOvr>
   <p:extLst>
     <p:ext uri="{DCECCB84-F9BA-43D5-87BE-67443E8EF086}">
-      <p15:sldGuideLst xmlns="" xmlns:p15="http://schemas.microsoft.com/office/powerpoint/2012/main"/>
+      <p15:sldGuideLst xmlns:p15="http://schemas.microsoft.com/office/powerpoint/2012/main" xmlns=""/>
     </p:ext>
   </p:extLst>
 </p:sldLayout>
@@ -4486,7 +4487,7 @@
           <a:p>
             <a:fld id="{FF632088-7E42-4B13-8645-6CA4616862AF}" type="datetimeFigureOut">
               <a:rPr lang="en-US" smtClean="0"/>
-              <a:t>2/23/2016</a:t>
+              <a:t>2/29/2016</a:t>
             </a:fld>
             <a:endParaRPr lang="en-US"/>
           </a:p>
@@ -4569,7 +4570,7 @@
   </p:clrMapOvr>
   <p:extLst>
     <p:ext uri="{DCECCB84-F9BA-43D5-87BE-67443E8EF086}">
-      <p15:sldGuideLst xmlns="" xmlns:p15="http://schemas.microsoft.com/office/powerpoint/2012/main"/>
+      <p15:sldGuideLst xmlns:p15="http://schemas.microsoft.com/office/powerpoint/2012/main" xmlns=""/>
     </p:ext>
   </p:extLst>
 </p:sldLayout>
@@ -4609,7 +4610,7 @@
           <a:p>
             <a:fld id="{FF632088-7E42-4B13-8645-6CA4616862AF}" type="datetimeFigureOut">
               <a:rPr lang="en-US" smtClean="0"/>
-              <a:t>2/23/2016</a:t>
+              <a:t>2/29/2016</a:t>
             </a:fld>
             <a:endParaRPr lang="en-US"/>
           </a:p>
@@ -4727,7 +4728,7 @@
           <a:p>
             <a:fld id="{FF632088-7E42-4B13-8645-6CA4616862AF}" type="datetimeFigureOut">
               <a:rPr lang="en-US" smtClean="0"/>
-              <a:t>2/23/2016</a:t>
+              <a:t>2/29/2016</a:t>
             </a:fld>
             <a:endParaRPr lang="en-US"/>
           </a:p>
@@ -5011,7 +5012,7 @@
           <a:p>
             <a:fld id="{FF632088-7E42-4B13-8645-6CA4616862AF}" type="datetimeFigureOut">
               <a:rPr lang="en-US" smtClean="0"/>
-              <a:t>2/23/2016</a:t>
+              <a:t>2/29/2016</a:t>
             </a:fld>
             <a:endParaRPr lang="en-US"/>
           </a:p>
@@ -5071,7 +5072,7 @@
   </p:clrMapOvr>
   <p:extLst>
     <p:ext uri="{DCECCB84-F9BA-43D5-87BE-67443E8EF086}">
-      <p15:sldGuideLst xmlns="" xmlns:p15="http://schemas.microsoft.com/office/powerpoint/2012/main"/>
+      <p15:sldGuideLst xmlns:p15="http://schemas.microsoft.com/office/powerpoint/2012/main" xmlns=""/>
     </p:ext>
   </p:extLst>
 </p:sldLayout>
@@ -5280,7 +5281,7 @@
           <a:p>
             <a:fld id="{FF632088-7E42-4B13-8645-6CA4616862AF}" type="datetimeFigureOut">
               <a:rPr lang="en-US" smtClean="0"/>
-              <a:t>2/23/2016</a:t>
+              <a:t>2/29/2016</a:t>
             </a:fld>
             <a:endParaRPr lang="en-US"/>
           </a:p>
@@ -5494,7 +5495,7 @@
           <a:p>
             <a:fld id="{FF632088-7E42-4B13-8645-6CA4616862AF}" type="datetimeFigureOut">
               <a:rPr lang="en-US" smtClean="0"/>
-              <a:t>2/23/2016</a:t>
+              <a:t>2/29/2016</a:t>
             </a:fld>
             <a:endParaRPr lang="en-US"/>
           </a:p>
@@ -5870,7 +5871,7 @@
   </p:txStyles>
   <p:extLst>
     <p:ext uri="{27BBF7A9-308A-43DC-89C8-2F10F3537804}">
-      <p15:sldGuideLst xmlns="" xmlns:p15="http://schemas.microsoft.com/office/powerpoint/2012/main"/>
+      <p15:sldGuideLst xmlns:p15="http://schemas.microsoft.com/office/powerpoint/2012/main" xmlns=""/>
     </p:ext>
   </p:extLst>
 </p:sldMaster>
@@ -6099,7 +6100,7 @@
           <a:p>
             <a:fld id="{FF632088-7E42-4B13-8645-6CA4616862AF}" type="datetimeFigureOut">
               <a:rPr lang="en-US" smtClean="0"/>
-              <a:t>2/23/2016</a:t>
+              <a:t>2/29/2016</a:t>
             </a:fld>
             <a:endParaRPr lang="en-US"/>
           </a:p>
@@ -6567,7 +6568,7 @@
   </p:txStyles>
   <p:extLst>
     <p:ext uri="{27BBF7A9-308A-43DC-89C8-2F10F3537804}">
-      <p15:sldGuideLst xmlns="" xmlns:p15="http://schemas.microsoft.com/office/powerpoint/2012/main"/>
+      <p15:sldGuideLst xmlns:p15="http://schemas.microsoft.com/office/powerpoint/2012/main" xmlns=""/>
     </p:ext>
   </p:extLst>
 </p:sldMaster>
@@ -6609,11 +6610,7 @@
           <a:p>
             <a:r>
               <a:rPr lang="en-US" dirty="0" smtClean="0"/>
-              <a:t>Protected Health </a:t>
-            </a:r>
-            <a:r>
-              <a:rPr lang="en-US" dirty="0" smtClean="0"/>
-              <a:t>Information and APCD Security</a:t>
+              <a:t>Protected Health Information and APCD Security</a:t>
             </a:r>
             <a:endParaRPr lang="en-US" dirty="0"/>
           </a:p>
@@ -6719,11 +6716,7 @@
           <a:p>
             <a:r>
               <a:rPr lang="en-US" dirty="0" smtClean="0"/>
-              <a:t>Wikipedia defines Protected Health Information (PHI) as “</a:t>
-            </a:r>
-            <a:r>
-              <a:rPr lang="en-US" dirty="0" smtClean="0"/>
-              <a:t>any </a:t>
+              <a:t>Wikipedia defines Protected Health Information (PHI) as “any </a:t>
             </a:r>
             <a:r>
               <a:rPr lang="en-US" dirty="0"/>
@@ -6963,11 +6956,7 @@
           <a:p>
             <a:r>
               <a:rPr lang="en-US" dirty="0" smtClean="0"/>
-              <a:t>Date elements</a:t>
-            </a:r>
-            <a:r>
-              <a:rPr lang="en-US" dirty="0" smtClean="0"/>
-              <a:t> containing PHI identifiers are encrypted in the APCD</a:t>
+              <a:t>Date elements containing PHI identifiers are encrypted in the APCD</a:t>
             </a:r>
           </a:p>
           <a:p>
@@ -7121,6 +7110,161 @@
 </file>
 
 <file path=ppt/slides/slide6.xml><?xml version="1.0" encoding="utf-8"?>
+<p:sld xmlns:a="http://schemas.openxmlformats.org/drawingml/2006/main" xmlns:r="http://schemas.openxmlformats.org/officeDocument/2006/relationships" xmlns:p="http://schemas.openxmlformats.org/presentationml/2006/main">
+  <p:cSld>
+    <p:spTree>
+      <p:nvGrpSpPr>
+        <p:cNvPr id="1" name=""/>
+        <p:cNvGrpSpPr/>
+        <p:nvPr/>
+      </p:nvGrpSpPr>
+      <p:grpSpPr>
+        <a:xfrm>
+          <a:off x="0" y="0"/>
+          <a:ext cx="0" cy="0"/>
+          <a:chOff x="0" y="0"/>
+          <a:chExt cx="0" cy="0"/>
+        </a:xfrm>
+      </p:grpSpPr>
+      <p:sp>
+        <p:nvSpPr>
+          <p:cNvPr id="2" name="Title 1"/>
+          <p:cNvSpPr>
+            <a:spLocks noGrp="1"/>
+          </p:cNvSpPr>
+          <p:nvPr>
+            <p:ph type="title"/>
+          </p:nvPr>
+        </p:nvSpPr>
+        <p:spPr/>
+        <p:txBody>
+          <a:bodyPr/>
+          <a:lstStyle/>
+          <a:p>
+            <a:r>
+              <a:rPr lang="en-US" dirty="0" smtClean="0"/>
+              <a:t>Social Security Numbers</a:t>
+            </a:r>
+            <a:endParaRPr lang="en-US" dirty="0"/>
+          </a:p>
+        </p:txBody>
+      </p:sp>
+      <p:sp>
+        <p:nvSpPr>
+          <p:cNvPr id="3" name="Content Placeholder 2"/>
+          <p:cNvSpPr>
+            <a:spLocks noGrp="1"/>
+          </p:cNvSpPr>
+          <p:nvPr>
+            <p:ph idx="1"/>
+          </p:nvPr>
+        </p:nvSpPr>
+        <p:spPr/>
+        <p:txBody>
+          <a:bodyPr>
+            <a:normAutofit fontScale="92500" lnSpcReduction="20000"/>
+          </a:bodyPr>
+          <a:lstStyle/>
+          <a:p>
+            <a:r>
+              <a:rPr lang="en-US" dirty="0" smtClean="0"/>
+              <a:t>Columns containing Social Security numbers and other highly sensitive data are encrypted.</a:t>
+            </a:r>
+          </a:p>
+          <a:p>
+            <a:r>
+              <a:rPr lang="en-US" dirty="0" smtClean="0"/>
+              <a:t>Unencrypted columns might accidentally contain </a:t>
+            </a:r>
+            <a:r>
+              <a:rPr lang="en-US" dirty="0"/>
+              <a:t>Social Security </a:t>
+            </a:r>
+            <a:r>
+              <a:rPr lang="en-US" dirty="0" smtClean="0"/>
+              <a:t>numbers.</a:t>
+            </a:r>
+          </a:p>
+          <a:p>
+            <a:pPr lvl="1"/>
+            <a:r>
+              <a:rPr lang="en-US" dirty="0"/>
+              <a:t>Social Security numbers can show up in many different columns in the APCD</a:t>
+            </a:r>
+            <a:r>
+              <a:rPr lang="en-US" dirty="0" smtClean="0"/>
+              <a:t>. </a:t>
+            </a:r>
+            <a:r>
+              <a:rPr lang="en-US" dirty="0"/>
+              <a:t>For example, they may appear as the medical record number, the  Patient ID or the </a:t>
+            </a:r>
+            <a:r>
+              <a:rPr lang="en-US" dirty="0" smtClean="0"/>
+              <a:t>Provider </a:t>
+            </a:r>
+            <a:r>
+              <a:rPr lang="en-US" dirty="0"/>
+              <a:t>ID</a:t>
+            </a:r>
+            <a:r>
+              <a:rPr lang="en-US" dirty="0" smtClean="0"/>
+              <a:t>.</a:t>
+            </a:r>
+          </a:p>
+          <a:p>
+            <a:r>
+              <a:rPr lang="en-US" dirty="0"/>
+              <a:t> </a:t>
+            </a:r>
+            <a:r>
+              <a:rPr lang="en-US" dirty="0" smtClean="0"/>
+              <a:t>Regular expression pattern matching code is used to search for any </a:t>
+            </a:r>
+            <a:r>
+              <a:rPr lang="en-US" dirty="0"/>
+              <a:t>values that could possibly be </a:t>
+            </a:r>
+            <a:r>
+              <a:rPr lang="en-US" dirty="0" smtClean="0"/>
+              <a:t>Social Security </a:t>
+            </a:r>
+            <a:r>
+              <a:rPr lang="en-US" dirty="0"/>
+              <a:t>numbers.</a:t>
+            </a:r>
+            <a:endParaRPr lang="en-US" dirty="0" smtClean="0"/>
+          </a:p>
+          <a:p>
+            <a:r>
+              <a:rPr lang="en-US" dirty="0" smtClean="0"/>
+              <a:t>Those values are then redacted to insure that Social </a:t>
+            </a:r>
+            <a:r>
+              <a:rPr lang="en-US" dirty="0"/>
+              <a:t>S</a:t>
+            </a:r>
+            <a:r>
+              <a:rPr lang="en-US" dirty="0" smtClean="0"/>
+              <a:t>ecurity numbers are not accidentally release.</a:t>
+            </a:r>
+          </a:p>
+        </p:txBody>
+      </p:sp>
+    </p:spTree>
+    <p:extLst>
+      <p:ext uri="{BB962C8B-B14F-4D97-AF65-F5344CB8AC3E}">
+        <p14:creationId xmlns:p14="http://schemas.microsoft.com/office/powerpoint/2010/main" val="2196840680"/>
+      </p:ext>
+    </p:extLst>
+  </p:cSld>
+  <p:clrMapOvr>
+    <a:masterClrMapping/>
+  </p:clrMapOvr>
+</p:sld>
+</file>
+
+<file path=ppt/slides/slide7.xml><?xml version="1.0" encoding="utf-8"?>
 <p:sld xmlns:a="http://schemas.openxmlformats.org/drawingml/2006/main" xmlns:r="http://schemas.openxmlformats.org/officeDocument/2006/relationships" xmlns:p="http://schemas.openxmlformats.org/presentationml/2006/main">
   <p:cSld>
     <p:spTree>
@@ -7755,7 +7899,7 @@
   <a:extraClrSchemeLst/>
   <a:extLst>
     <a:ext uri="{05A4C25C-085E-4340-85A3-A5531E510DB2}">
-      <thm15:themeFamily xmlns="" xmlns:thm15="http://schemas.microsoft.com/office/thememl/2012/main" name="Gallery" id="{BBFCD31E-59A1-489D-B089-A3EAD7CAE12E}" vid="{AC464412-510E-4F2B-8947-A0DDBD028997}"/>
+      <thm15:themeFamily xmlns:thm15="http://schemas.microsoft.com/office/thememl/2012/main" xmlns="" name="Gallery" id="{BBFCD31E-59A1-489D-B089-A3EAD7CAE12E}" vid="{AC464412-510E-4F2B-8947-A0DDBD028997}"/>
     </a:ext>
   </a:extLst>
 </a:theme>

</xml_diff>